<commit_message>
Add Lecture 9 materials and update Lecture 8 slides for Numerical Integration
</commit_message>
<xml_diff>
--- a/slides/Lecture8-02-11-25-NumericalIntegration.pptx
+++ b/slides/Lecture8-02-11-25-NumericalIntegration.pptx
@@ -5,7 +5,7 @@
     <p:sldMasterId id="2147483660" r:id="rId1"/>
   </p:sldMasterIdLst>
   <p:notesMasterIdLst>
-    <p:notesMasterId r:id="rId30"/>
+    <p:notesMasterId r:id="rId34"/>
   </p:notesMasterIdLst>
   <p:sldIdLst>
     <p:sldId id="259" r:id="rId2"/>
@@ -29,13 +29,17 @@
     <p:sldId id="866" r:id="rId20"/>
     <p:sldId id="867" r:id="rId21"/>
     <p:sldId id="868" r:id="rId22"/>
-    <p:sldId id="869" r:id="rId23"/>
-    <p:sldId id="870" r:id="rId24"/>
-    <p:sldId id="871" r:id="rId25"/>
-    <p:sldId id="872" r:id="rId26"/>
-    <p:sldId id="873" r:id="rId27"/>
-    <p:sldId id="874" r:id="rId28"/>
-    <p:sldId id="875" r:id="rId29"/>
+    <p:sldId id="876" r:id="rId23"/>
+    <p:sldId id="879" r:id="rId24"/>
+    <p:sldId id="877" r:id="rId25"/>
+    <p:sldId id="878" r:id="rId26"/>
+    <p:sldId id="869" r:id="rId27"/>
+    <p:sldId id="870" r:id="rId28"/>
+    <p:sldId id="871" r:id="rId29"/>
+    <p:sldId id="872" r:id="rId30"/>
+    <p:sldId id="873" r:id="rId31"/>
+    <p:sldId id="874" r:id="rId32"/>
+    <p:sldId id="875" r:id="rId33"/>
   </p:sldIdLst>
   <p:sldSz cx="12192000" cy="6858000"/>
   <p:notesSz cx="7102475" cy="10234613"/>
@@ -160,6 +164,10 @@
             <p14:sldId id="866"/>
             <p14:sldId id="867"/>
             <p14:sldId id="868"/>
+            <p14:sldId id="876"/>
+            <p14:sldId id="879"/>
+            <p14:sldId id="877"/>
+            <p14:sldId id="878"/>
             <p14:sldId id="869"/>
             <p14:sldId id="870"/>
             <p14:sldId id="871"/>
@@ -279,7 +287,7 @@
           <a:p>
             <a:fld id="{961AF02B-09B0-4980-983D-27C0EDB561B5}" type="datetimeFigureOut">
               <a:rPr lang="uk-UA" smtClean="0"/>
-              <a:t>11.02.25</a:t>
+              <a:t>13.02.25</a:t>
             </a:fld>
             <a:endParaRPr lang="uk-UA"/>
           </a:p>
@@ -8656,6 +8664,1290 @@
   <p:cSld>
     <p:spTree>
       <p:nvGrpSpPr>
+        <p:cNvPr id="1" name="">
+          <a:extLst>
+            <a:ext uri="{FF2B5EF4-FFF2-40B4-BE49-F238E27FC236}">
+              <a16:creationId xmlns:a16="http://schemas.microsoft.com/office/drawing/2014/main" id="{6AEFC9C0-7E54-7396-5012-3BD3A8C84688}"/>
+            </a:ext>
+          </a:extLst>
+        </p:cNvPr>
+        <p:cNvGrpSpPr/>
+        <p:nvPr/>
+      </p:nvGrpSpPr>
+      <p:grpSpPr>
+        <a:xfrm>
+          <a:off x="0" y="0"/>
+          <a:ext cx="0" cy="0"/>
+          <a:chOff x="0" y="0"/>
+          <a:chExt cx="0" cy="0"/>
+        </a:xfrm>
+      </p:grpSpPr>
+      <p:sp>
+        <p:nvSpPr>
+          <p:cNvPr id="2" name="Title 1">
+            <a:extLst>
+              <a:ext uri="{FF2B5EF4-FFF2-40B4-BE49-F238E27FC236}">
+                <a16:creationId xmlns:a16="http://schemas.microsoft.com/office/drawing/2014/main" id="{C79039CC-619B-2A36-7299-1E48DC31DDED}"/>
+              </a:ext>
+            </a:extLst>
+          </p:cNvPr>
+          <p:cNvSpPr>
+            <a:spLocks noGrp="1"/>
+          </p:cNvSpPr>
+          <p:nvPr>
+            <p:ph type="title"/>
+          </p:nvPr>
+        </p:nvSpPr>
+        <p:spPr/>
+        <p:txBody>
+          <a:bodyPr/>
+          <a:lstStyle/>
+          <a:p>
+            <a:r>
+              <a:rPr lang="en-US" dirty="0"/>
+              <a:t>Discontinuous integrals</a:t>
+            </a:r>
+            <a:endParaRPr lang="uk-UA" dirty="0"/>
+          </a:p>
+        </p:txBody>
+      </p:sp>
+      <p:sp>
+        <p:nvSpPr>
+          <p:cNvPr id="7" name="Text Placeholder 6">
+            <a:extLst>
+              <a:ext uri="{FF2B5EF4-FFF2-40B4-BE49-F238E27FC236}">
+                <a16:creationId xmlns:a16="http://schemas.microsoft.com/office/drawing/2014/main" id="{BA1DD0D1-32DA-07D8-4645-4FBA01D18B53}"/>
+              </a:ext>
+            </a:extLst>
+          </p:cNvPr>
+          <p:cNvSpPr>
+            <a:spLocks noGrp="1"/>
+          </p:cNvSpPr>
+          <p:nvPr>
+            <p:ph type="body" sz="quarter" idx="12"/>
+          </p:nvPr>
+        </p:nvSpPr>
+        <p:spPr/>
+        <p:txBody>
+          <a:bodyPr/>
+          <a:lstStyle/>
+          <a:p>
+            <a:endParaRPr lang="en-US"/>
+          </a:p>
+        </p:txBody>
+      </p:sp>
+      <p:sp>
+        <p:nvSpPr>
+          <p:cNvPr id="13" name="TextBox 12">
+            <a:extLst>
+              <a:ext uri="{FF2B5EF4-FFF2-40B4-BE49-F238E27FC236}">
+                <a16:creationId xmlns:a16="http://schemas.microsoft.com/office/drawing/2014/main" id="{F5211C3F-D9F5-A008-CD32-DD4657557444}"/>
+              </a:ext>
+            </a:extLst>
+          </p:cNvPr>
+          <p:cNvSpPr txBox="1"/>
+          <p:nvPr/>
+        </p:nvSpPr>
+        <p:spPr>
+          <a:xfrm>
+            <a:off x="726712" y="1165086"/>
+            <a:ext cx="7565950" cy="430887"/>
+          </a:xfrm>
+          <a:prstGeom prst="rect">
+            <a:avLst/>
+          </a:prstGeom>
+          <a:noFill/>
+        </p:spPr>
+        <p:txBody>
+          <a:bodyPr wrap="square">
+            <a:spAutoFit/>
+          </a:bodyPr>
+          <a:lstStyle/>
+          <a:p>
+            <a:r>
+              <a:rPr lang="en-US" sz="2200" dirty="0">
+                <a:effectLst/>
+                <a:latin typeface="+mj-lt"/>
+                <a:ea typeface="DejaVu Sans"/>
+              </a:rPr>
+              <a:t>Nothing wrong with integrating discontinuous functions</a:t>
+            </a:r>
+            <a:endParaRPr lang="en-US" sz="2200" i="1" dirty="0">
+              <a:effectLst/>
+              <a:latin typeface="+mj-lt"/>
+              <a:ea typeface="DejaVu Sans"/>
+            </a:endParaRPr>
+          </a:p>
+        </p:txBody>
+      </p:sp>
+      <p:pic>
+        <p:nvPicPr>
+          <p:cNvPr id="3" name="Picture 2">
+            <a:extLst>
+              <a:ext uri="{FF2B5EF4-FFF2-40B4-BE49-F238E27FC236}">
+                <a16:creationId xmlns:a16="http://schemas.microsoft.com/office/drawing/2014/main" id="{DC17C353-5D49-EAA3-0801-453156EDBE02}"/>
+              </a:ext>
+            </a:extLst>
+          </p:cNvPr>
+          <p:cNvPicPr>
+            <a:picLocks noChangeAspect="1"/>
+          </p:cNvPicPr>
+          <p:nvPr/>
+        </p:nvPicPr>
+        <p:blipFill>
+          <a:blip r:embed="rId2"/>
+          <a:stretch>
+            <a:fillRect/>
+          </a:stretch>
+        </p:blipFill>
+        <p:spPr>
+          <a:xfrm>
+            <a:off x="726712" y="1790421"/>
+            <a:ext cx="4000500" cy="1079500"/>
+          </a:xfrm>
+          <a:prstGeom prst="rect">
+            <a:avLst/>
+          </a:prstGeom>
+        </p:spPr>
+      </p:pic>
+      <p:pic>
+        <p:nvPicPr>
+          <p:cNvPr id="5" name="Picture 4">
+            <a:extLst>
+              <a:ext uri="{FF2B5EF4-FFF2-40B4-BE49-F238E27FC236}">
+                <a16:creationId xmlns:a16="http://schemas.microsoft.com/office/drawing/2014/main" id="{09BC3C10-AC85-9FBE-441B-EDE7DAB0A692}"/>
+              </a:ext>
+            </a:extLst>
+          </p:cNvPr>
+          <p:cNvPicPr>
+            <a:picLocks noChangeAspect="1"/>
+          </p:cNvPicPr>
+          <p:nvPr/>
+        </p:nvPicPr>
+        <p:blipFill>
+          <a:blip r:embed="rId3"/>
+          <a:stretch>
+            <a:fillRect/>
+          </a:stretch>
+        </p:blipFill>
+        <p:spPr>
+          <a:xfrm>
+            <a:off x="7314762" y="1897458"/>
+            <a:ext cx="1955800" cy="863600"/>
+          </a:xfrm>
+          <a:prstGeom prst="rect">
+            <a:avLst/>
+          </a:prstGeom>
+        </p:spPr>
+      </p:pic>
+      <p:pic>
+        <p:nvPicPr>
+          <p:cNvPr id="1026" name="Picture 2">
+            <a:extLst>
+              <a:ext uri="{FF2B5EF4-FFF2-40B4-BE49-F238E27FC236}">
+                <a16:creationId xmlns:a16="http://schemas.microsoft.com/office/drawing/2014/main" id="{811CF9A3-0D8A-9061-CBBD-4A9E64206AFC}"/>
+              </a:ext>
+            </a:extLst>
+          </p:cNvPr>
+          <p:cNvPicPr>
+            <a:picLocks noChangeAspect="1" noChangeArrowheads="1"/>
+          </p:cNvPicPr>
+          <p:nvPr/>
+        </p:nvPicPr>
+        <p:blipFill>
+          <a:blip r:embed="rId4">
+            <a:extLst>
+              <a:ext uri="{28A0092B-C50C-407E-A947-70E740481C1C}">
+                <a14:useLocalDpi xmlns:a14="http://schemas.microsoft.com/office/drawing/2010/main" val="0"/>
+              </a:ext>
+            </a:extLst>
+          </a:blip>
+          <a:srcRect/>
+          <a:stretch>
+            <a:fillRect/>
+          </a:stretch>
+        </p:blipFill>
+        <p:spPr bwMode="auto">
+          <a:xfrm>
+            <a:off x="370541" y="2869921"/>
+            <a:ext cx="4824504" cy="3643332"/>
+          </a:xfrm>
+          <a:prstGeom prst="rect">
+            <a:avLst/>
+          </a:prstGeom>
+          <a:noFill/>
+          <a:extLst>
+            <a:ext uri="{909E8E84-426E-40DD-AFC4-6F175D3DCCD1}">
+              <a14:hiddenFill xmlns:a14="http://schemas.microsoft.com/office/drawing/2010/main">
+                <a:solidFill>
+                  <a:srgbClr val="FFFFFF"/>
+                </a:solidFill>
+              </a14:hiddenFill>
+            </a:ext>
+          </a:extLst>
+        </p:spPr>
+      </p:pic>
+      <p:pic>
+        <p:nvPicPr>
+          <p:cNvPr id="6" name="Picture 5">
+            <a:extLst>
+              <a:ext uri="{FF2B5EF4-FFF2-40B4-BE49-F238E27FC236}">
+                <a16:creationId xmlns:a16="http://schemas.microsoft.com/office/drawing/2014/main" id="{C08784E6-23FC-B6B9-0BB8-80E7283C68DD}"/>
+              </a:ext>
+            </a:extLst>
+          </p:cNvPr>
+          <p:cNvPicPr>
+            <a:picLocks noChangeAspect="1"/>
+          </p:cNvPicPr>
+          <p:nvPr/>
+        </p:nvPicPr>
+        <p:blipFill>
+          <a:blip r:embed="rId5"/>
+          <a:stretch>
+            <a:fillRect/>
+          </a:stretch>
+        </p:blipFill>
+        <p:spPr>
+          <a:xfrm>
+            <a:off x="6147183" y="2869921"/>
+            <a:ext cx="4824504" cy="3643332"/>
+          </a:xfrm>
+          <a:prstGeom prst="rect">
+            <a:avLst/>
+          </a:prstGeom>
+        </p:spPr>
+      </p:pic>
+    </p:spTree>
+    <p:extLst>
+      <p:ext uri="{BB962C8B-B14F-4D97-AF65-F5344CB8AC3E}">
+        <p14:creationId xmlns:p14="http://schemas.microsoft.com/office/powerpoint/2010/main" val="3625404953"/>
+      </p:ext>
+    </p:extLst>
+  </p:cSld>
+  <p:clrMapOvr>
+    <a:masterClrMapping/>
+  </p:clrMapOvr>
+</p:sld>
+</file>
+
+<file path=ppt/slides/slide23.xml><?xml version="1.0" encoding="utf-8"?>
+<p:sld xmlns:a="http://schemas.openxmlformats.org/drawingml/2006/main" xmlns:r="http://schemas.openxmlformats.org/officeDocument/2006/relationships" xmlns:p="http://schemas.openxmlformats.org/presentationml/2006/main">
+  <p:cSld>
+    <p:spTree>
+      <p:nvGrpSpPr>
+        <p:cNvPr id="1" name="">
+          <a:extLst>
+            <a:ext uri="{FF2B5EF4-FFF2-40B4-BE49-F238E27FC236}">
+              <a16:creationId xmlns:a16="http://schemas.microsoft.com/office/drawing/2014/main" id="{738210C1-7107-1A20-542D-316429F7D93E}"/>
+            </a:ext>
+          </a:extLst>
+        </p:cNvPr>
+        <p:cNvGrpSpPr/>
+        <p:nvPr/>
+      </p:nvGrpSpPr>
+      <p:grpSpPr>
+        <a:xfrm>
+          <a:off x="0" y="0"/>
+          <a:ext cx="0" cy="0"/>
+          <a:chOff x="0" y="0"/>
+          <a:chExt cx="0" cy="0"/>
+        </a:xfrm>
+      </p:grpSpPr>
+      <p:sp>
+        <p:nvSpPr>
+          <p:cNvPr id="2" name="Title 1">
+            <a:extLst>
+              <a:ext uri="{FF2B5EF4-FFF2-40B4-BE49-F238E27FC236}">
+                <a16:creationId xmlns:a16="http://schemas.microsoft.com/office/drawing/2014/main" id="{CD4F6FC8-E437-446E-0ABC-500B9D40A8E3}"/>
+              </a:ext>
+            </a:extLst>
+          </p:cNvPr>
+          <p:cNvSpPr>
+            <a:spLocks noGrp="1"/>
+          </p:cNvSpPr>
+          <p:nvPr>
+            <p:ph type="title"/>
+          </p:nvPr>
+        </p:nvSpPr>
+        <p:spPr/>
+        <p:txBody>
+          <a:bodyPr/>
+          <a:lstStyle/>
+          <a:p>
+            <a:r>
+              <a:rPr lang="en-US" dirty="0"/>
+              <a:t>Discontinuous integrals</a:t>
+            </a:r>
+            <a:endParaRPr lang="uk-UA" dirty="0"/>
+          </a:p>
+        </p:txBody>
+      </p:sp>
+      <p:sp>
+        <p:nvSpPr>
+          <p:cNvPr id="7" name="Text Placeholder 6">
+            <a:extLst>
+              <a:ext uri="{FF2B5EF4-FFF2-40B4-BE49-F238E27FC236}">
+                <a16:creationId xmlns:a16="http://schemas.microsoft.com/office/drawing/2014/main" id="{48C5420D-B73B-0302-69DA-FF51725E6C06}"/>
+              </a:ext>
+            </a:extLst>
+          </p:cNvPr>
+          <p:cNvSpPr>
+            <a:spLocks noGrp="1"/>
+          </p:cNvSpPr>
+          <p:nvPr>
+            <p:ph type="body" sz="quarter" idx="12"/>
+          </p:nvPr>
+        </p:nvSpPr>
+        <p:spPr/>
+        <p:txBody>
+          <a:bodyPr/>
+          <a:lstStyle/>
+          <a:p>
+            <a:endParaRPr lang="en-US"/>
+          </a:p>
+        </p:txBody>
+      </p:sp>
+      <p:pic>
+        <p:nvPicPr>
+          <p:cNvPr id="3" name="Picture 2">
+            <a:extLst>
+              <a:ext uri="{FF2B5EF4-FFF2-40B4-BE49-F238E27FC236}">
+                <a16:creationId xmlns:a16="http://schemas.microsoft.com/office/drawing/2014/main" id="{F70C96D3-F2DD-C864-106E-31D2E93A681F}"/>
+              </a:ext>
+            </a:extLst>
+          </p:cNvPr>
+          <p:cNvPicPr>
+            <a:picLocks noChangeAspect="1"/>
+          </p:cNvPicPr>
+          <p:nvPr/>
+        </p:nvPicPr>
+        <p:blipFill>
+          <a:blip r:embed="rId2"/>
+          <a:stretch>
+            <a:fillRect/>
+          </a:stretch>
+        </p:blipFill>
+        <p:spPr>
+          <a:xfrm>
+            <a:off x="782543" y="1165086"/>
+            <a:ext cx="4000500" cy="1079500"/>
+          </a:xfrm>
+          <a:prstGeom prst="rect">
+            <a:avLst/>
+          </a:prstGeom>
+        </p:spPr>
+      </p:pic>
+      <p:pic>
+        <p:nvPicPr>
+          <p:cNvPr id="5" name="Picture 4">
+            <a:extLst>
+              <a:ext uri="{FF2B5EF4-FFF2-40B4-BE49-F238E27FC236}">
+                <a16:creationId xmlns:a16="http://schemas.microsoft.com/office/drawing/2014/main" id="{AE67661B-EEB5-2628-4F6D-6349B1B299F3}"/>
+              </a:ext>
+            </a:extLst>
+          </p:cNvPr>
+          <p:cNvPicPr>
+            <a:picLocks noChangeAspect="1"/>
+          </p:cNvPicPr>
+          <p:nvPr/>
+        </p:nvPicPr>
+        <p:blipFill>
+          <a:blip r:embed="rId3"/>
+          <a:stretch>
+            <a:fillRect/>
+          </a:stretch>
+        </p:blipFill>
+        <p:spPr>
+          <a:xfrm>
+            <a:off x="7324351" y="1273036"/>
+            <a:ext cx="1955800" cy="863600"/>
+          </a:xfrm>
+          <a:prstGeom prst="rect">
+            <a:avLst/>
+          </a:prstGeom>
+        </p:spPr>
+      </p:pic>
+      <p:pic>
+        <p:nvPicPr>
+          <p:cNvPr id="4098" name="Picture 2">
+            <a:extLst>
+              <a:ext uri="{FF2B5EF4-FFF2-40B4-BE49-F238E27FC236}">
+                <a16:creationId xmlns:a16="http://schemas.microsoft.com/office/drawing/2014/main" id="{E1F06AB1-C241-EDDB-44BB-B0FA7D1022E8}"/>
+              </a:ext>
+            </a:extLst>
+          </p:cNvPr>
+          <p:cNvPicPr>
+            <a:picLocks noChangeAspect="1" noChangeArrowheads="1"/>
+          </p:cNvPicPr>
+          <p:nvPr/>
+        </p:nvPicPr>
+        <p:blipFill>
+          <a:blip r:embed="rId4">
+            <a:extLst>
+              <a:ext uri="{28A0092B-C50C-407E-A947-70E740481C1C}">
+                <a14:useLocalDpi xmlns:a14="http://schemas.microsoft.com/office/drawing/2010/main" val="0"/>
+              </a:ext>
+            </a:extLst>
+          </a:blip>
+          <a:srcRect/>
+          <a:stretch>
+            <a:fillRect/>
+          </a:stretch>
+        </p:blipFill>
+        <p:spPr bwMode="auto">
+          <a:xfrm>
+            <a:off x="6495079" y="2521344"/>
+            <a:ext cx="5168726" cy="3903279"/>
+          </a:xfrm>
+          <a:prstGeom prst="rect">
+            <a:avLst/>
+          </a:prstGeom>
+          <a:noFill/>
+          <a:extLst>
+            <a:ext uri="{909E8E84-426E-40DD-AFC4-6F175D3DCCD1}">
+              <a14:hiddenFill xmlns:a14="http://schemas.microsoft.com/office/drawing/2010/main">
+                <a:solidFill>
+                  <a:srgbClr val="FFFFFF"/>
+                </a:solidFill>
+              </a14:hiddenFill>
+            </a:ext>
+          </a:extLst>
+        </p:spPr>
+      </p:pic>
+      <p:pic>
+        <p:nvPicPr>
+          <p:cNvPr id="4100" name="Picture 4">
+            <a:extLst>
+              <a:ext uri="{FF2B5EF4-FFF2-40B4-BE49-F238E27FC236}">
+                <a16:creationId xmlns:a16="http://schemas.microsoft.com/office/drawing/2014/main" id="{01F75E74-81E4-313E-701B-243AE1086B02}"/>
+              </a:ext>
+            </a:extLst>
+          </p:cNvPr>
+          <p:cNvPicPr>
+            <a:picLocks noChangeAspect="1" noChangeArrowheads="1"/>
+          </p:cNvPicPr>
+          <p:nvPr/>
+        </p:nvPicPr>
+        <p:blipFill>
+          <a:blip r:embed="rId5">
+            <a:extLst>
+              <a:ext uri="{28A0092B-C50C-407E-A947-70E740481C1C}">
+                <a14:useLocalDpi xmlns:a14="http://schemas.microsoft.com/office/drawing/2010/main" val="0"/>
+              </a:ext>
+            </a:extLst>
+          </a:blip>
+          <a:srcRect/>
+          <a:stretch>
+            <a:fillRect/>
+          </a:stretch>
+        </p:blipFill>
+        <p:spPr bwMode="auto">
+          <a:xfrm>
+            <a:off x="467910" y="2564012"/>
+            <a:ext cx="5229013" cy="3948806"/>
+          </a:xfrm>
+          <a:prstGeom prst="rect">
+            <a:avLst/>
+          </a:prstGeom>
+          <a:noFill/>
+          <a:extLst>
+            <a:ext uri="{909E8E84-426E-40DD-AFC4-6F175D3DCCD1}">
+              <a14:hiddenFill xmlns:a14="http://schemas.microsoft.com/office/drawing/2010/main">
+                <a:solidFill>
+                  <a:srgbClr val="FFFFFF"/>
+                </a:solidFill>
+              </a14:hiddenFill>
+            </a:ext>
+          </a:extLst>
+        </p:spPr>
+      </p:pic>
+    </p:spTree>
+    <p:extLst>
+      <p:ext uri="{BB962C8B-B14F-4D97-AF65-F5344CB8AC3E}">
+        <p14:creationId xmlns:p14="http://schemas.microsoft.com/office/powerpoint/2010/main" val="2124523353"/>
+      </p:ext>
+    </p:extLst>
+  </p:cSld>
+  <p:clrMapOvr>
+    <a:masterClrMapping/>
+  </p:clrMapOvr>
+</p:sld>
+</file>
+
+<file path=ppt/slides/slide24.xml><?xml version="1.0" encoding="utf-8"?>
+<p:sld xmlns:a="http://schemas.openxmlformats.org/drawingml/2006/main" xmlns:r="http://schemas.openxmlformats.org/officeDocument/2006/relationships" xmlns:p="http://schemas.openxmlformats.org/presentationml/2006/main">
+  <p:cSld>
+    <p:spTree>
+      <p:nvGrpSpPr>
+        <p:cNvPr id="1" name="">
+          <a:extLst>
+            <a:ext uri="{FF2B5EF4-FFF2-40B4-BE49-F238E27FC236}">
+              <a16:creationId xmlns:a16="http://schemas.microsoft.com/office/drawing/2014/main" id="{8672DB6A-C86D-0387-6C97-C5DCD58E56FC}"/>
+            </a:ext>
+          </a:extLst>
+        </p:cNvPr>
+        <p:cNvGrpSpPr/>
+        <p:nvPr/>
+      </p:nvGrpSpPr>
+      <p:grpSpPr>
+        <a:xfrm>
+          <a:off x="0" y="0"/>
+          <a:ext cx="0" cy="0"/>
+          <a:chOff x="0" y="0"/>
+          <a:chExt cx="0" cy="0"/>
+        </a:xfrm>
+      </p:grpSpPr>
+      <p:sp>
+        <p:nvSpPr>
+          <p:cNvPr id="2" name="Title 1">
+            <a:extLst>
+              <a:ext uri="{FF2B5EF4-FFF2-40B4-BE49-F238E27FC236}">
+                <a16:creationId xmlns:a16="http://schemas.microsoft.com/office/drawing/2014/main" id="{DAF2B285-6A2A-EC96-5F97-64C203EC4C31}"/>
+              </a:ext>
+            </a:extLst>
+          </p:cNvPr>
+          <p:cNvSpPr>
+            <a:spLocks noGrp="1"/>
+          </p:cNvSpPr>
+          <p:nvPr>
+            <p:ph type="title"/>
+          </p:nvPr>
+        </p:nvSpPr>
+        <p:spPr/>
+        <p:txBody>
+          <a:bodyPr/>
+          <a:lstStyle/>
+          <a:p>
+            <a:r>
+              <a:rPr lang="en-US" dirty="0"/>
+              <a:t>Discontinuous integrals</a:t>
+            </a:r>
+            <a:endParaRPr lang="uk-UA" dirty="0"/>
+          </a:p>
+        </p:txBody>
+      </p:sp>
+      <p:sp>
+        <p:nvSpPr>
+          <p:cNvPr id="7" name="Text Placeholder 6">
+            <a:extLst>
+              <a:ext uri="{FF2B5EF4-FFF2-40B4-BE49-F238E27FC236}">
+                <a16:creationId xmlns:a16="http://schemas.microsoft.com/office/drawing/2014/main" id="{BE225797-BD72-448F-A411-415732DDC061}"/>
+              </a:ext>
+            </a:extLst>
+          </p:cNvPr>
+          <p:cNvSpPr>
+            <a:spLocks noGrp="1"/>
+          </p:cNvSpPr>
+          <p:nvPr>
+            <p:ph type="body" sz="quarter" idx="12"/>
+          </p:nvPr>
+        </p:nvSpPr>
+        <p:spPr/>
+        <p:txBody>
+          <a:bodyPr/>
+          <a:lstStyle/>
+          <a:p>
+            <a:endParaRPr lang="en-US"/>
+          </a:p>
+        </p:txBody>
+      </p:sp>
+      <p:pic>
+        <p:nvPicPr>
+          <p:cNvPr id="3" name="Picture 2">
+            <a:extLst>
+              <a:ext uri="{FF2B5EF4-FFF2-40B4-BE49-F238E27FC236}">
+                <a16:creationId xmlns:a16="http://schemas.microsoft.com/office/drawing/2014/main" id="{61610E2D-B5DC-A6A3-C06A-95B654BCC307}"/>
+              </a:ext>
+            </a:extLst>
+          </p:cNvPr>
+          <p:cNvPicPr>
+            <a:picLocks noChangeAspect="1"/>
+          </p:cNvPicPr>
+          <p:nvPr/>
+        </p:nvPicPr>
+        <p:blipFill>
+          <a:blip r:embed="rId2"/>
+          <a:stretch>
+            <a:fillRect/>
+          </a:stretch>
+        </p:blipFill>
+        <p:spPr>
+          <a:xfrm>
+            <a:off x="782543" y="1165086"/>
+            <a:ext cx="4000500" cy="1079500"/>
+          </a:xfrm>
+          <a:prstGeom prst="rect">
+            <a:avLst/>
+          </a:prstGeom>
+        </p:spPr>
+      </p:pic>
+      <p:pic>
+        <p:nvPicPr>
+          <p:cNvPr id="5" name="Picture 4">
+            <a:extLst>
+              <a:ext uri="{FF2B5EF4-FFF2-40B4-BE49-F238E27FC236}">
+                <a16:creationId xmlns:a16="http://schemas.microsoft.com/office/drawing/2014/main" id="{B4DB2E06-33E7-9077-14C4-6209005D412B}"/>
+              </a:ext>
+            </a:extLst>
+          </p:cNvPr>
+          <p:cNvPicPr>
+            <a:picLocks noChangeAspect="1"/>
+          </p:cNvPicPr>
+          <p:nvPr/>
+        </p:nvPicPr>
+        <p:blipFill>
+          <a:blip r:embed="rId3"/>
+          <a:stretch>
+            <a:fillRect/>
+          </a:stretch>
+        </p:blipFill>
+        <p:spPr>
+          <a:xfrm>
+            <a:off x="7324351" y="1273036"/>
+            <a:ext cx="1955800" cy="863600"/>
+          </a:xfrm>
+          <a:prstGeom prst="rect">
+            <a:avLst/>
+          </a:prstGeom>
+        </p:spPr>
+      </p:pic>
+      <p:pic>
+        <p:nvPicPr>
+          <p:cNvPr id="4" name="Picture 3">
+            <a:extLst>
+              <a:ext uri="{FF2B5EF4-FFF2-40B4-BE49-F238E27FC236}">
+                <a16:creationId xmlns:a16="http://schemas.microsoft.com/office/drawing/2014/main" id="{7F0C6A7C-6411-141E-F8F0-ADD62EF8D7AA}"/>
+              </a:ext>
+            </a:extLst>
+          </p:cNvPr>
+          <p:cNvPicPr>
+            <a:picLocks noChangeAspect="1"/>
+          </p:cNvPicPr>
+          <p:nvPr/>
+        </p:nvPicPr>
+        <p:blipFill>
+          <a:blip r:embed="rId4"/>
+          <a:stretch>
+            <a:fillRect/>
+          </a:stretch>
+        </p:blipFill>
+        <p:spPr>
+          <a:xfrm>
+            <a:off x="503143" y="2397552"/>
+            <a:ext cx="4559300" cy="749300"/>
+          </a:xfrm>
+          <a:prstGeom prst="rect">
+            <a:avLst/>
+          </a:prstGeom>
+        </p:spPr>
+      </p:pic>
+      <p:pic>
+        <p:nvPicPr>
+          <p:cNvPr id="8" name="Picture 7">
+            <a:extLst>
+              <a:ext uri="{FF2B5EF4-FFF2-40B4-BE49-F238E27FC236}">
+                <a16:creationId xmlns:a16="http://schemas.microsoft.com/office/drawing/2014/main" id="{BA862045-7561-9A19-6F9C-7B0319CAD578}"/>
+              </a:ext>
+            </a:extLst>
+          </p:cNvPr>
+          <p:cNvPicPr>
+            <a:picLocks noChangeAspect="1"/>
+          </p:cNvPicPr>
+          <p:nvPr/>
+        </p:nvPicPr>
+        <p:blipFill>
+          <a:blip r:embed="rId5"/>
+          <a:stretch>
+            <a:fillRect/>
+          </a:stretch>
+        </p:blipFill>
+        <p:spPr>
+          <a:xfrm>
+            <a:off x="5553443" y="2458039"/>
+            <a:ext cx="6135414" cy="628325"/>
+          </a:xfrm>
+          <a:prstGeom prst="rect">
+            <a:avLst/>
+          </a:prstGeom>
+        </p:spPr>
+      </p:pic>
+      <p:pic>
+        <p:nvPicPr>
+          <p:cNvPr id="9" name="Picture 8">
+            <a:extLst>
+              <a:ext uri="{FF2B5EF4-FFF2-40B4-BE49-F238E27FC236}">
+                <a16:creationId xmlns:a16="http://schemas.microsoft.com/office/drawing/2014/main" id="{065E9D3C-9C0C-A618-EBCD-CA94089C9C02}"/>
+              </a:ext>
+            </a:extLst>
+          </p:cNvPr>
+          <p:cNvPicPr>
+            <a:picLocks noChangeAspect="1"/>
+          </p:cNvPicPr>
+          <p:nvPr/>
+        </p:nvPicPr>
+        <p:blipFill>
+          <a:blip r:embed="rId6"/>
+          <a:stretch>
+            <a:fillRect/>
+          </a:stretch>
+        </p:blipFill>
+        <p:spPr>
+          <a:xfrm>
+            <a:off x="503143" y="3477052"/>
+            <a:ext cx="4559300" cy="670133"/>
+          </a:xfrm>
+          <a:prstGeom prst="rect">
+            <a:avLst/>
+          </a:prstGeom>
+        </p:spPr>
+      </p:pic>
+      <p:pic>
+        <p:nvPicPr>
+          <p:cNvPr id="10" name="Picture 9">
+            <a:extLst>
+              <a:ext uri="{FF2B5EF4-FFF2-40B4-BE49-F238E27FC236}">
+                <a16:creationId xmlns:a16="http://schemas.microsoft.com/office/drawing/2014/main" id="{6ECA0036-0D2F-6D5E-B5C4-827391A3EBCB}"/>
+              </a:ext>
+            </a:extLst>
+          </p:cNvPr>
+          <p:cNvPicPr>
+            <a:picLocks noChangeAspect="1"/>
+          </p:cNvPicPr>
+          <p:nvPr/>
+        </p:nvPicPr>
+        <p:blipFill>
+          <a:blip r:embed="rId7"/>
+          <a:stretch>
+            <a:fillRect/>
+          </a:stretch>
+        </p:blipFill>
+        <p:spPr>
+          <a:xfrm>
+            <a:off x="5553443" y="3491037"/>
+            <a:ext cx="6135414" cy="599019"/>
+          </a:xfrm>
+          <a:prstGeom prst="rect">
+            <a:avLst/>
+          </a:prstGeom>
+        </p:spPr>
+      </p:pic>
+      <p:pic>
+        <p:nvPicPr>
+          <p:cNvPr id="11" name="Picture 10">
+            <a:extLst>
+              <a:ext uri="{FF2B5EF4-FFF2-40B4-BE49-F238E27FC236}">
+                <a16:creationId xmlns:a16="http://schemas.microsoft.com/office/drawing/2014/main" id="{CDDAEDE6-B1FD-FB33-1042-93378CFB1152}"/>
+              </a:ext>
+            </a:extLst>
+          </p:cNvPr>
+          <p:cNvPicPr>
+            <a:picLocks noChangeAspect="1"/>
+          </p:cNvPicPr>
+          <p:nvPr/>
+        </p:nvPicPr>
+        <p:blipFill>
+          <a:blip r:embed="rId8"/>
+          <a:stretch>
+            <a:fillRect/>
+          </a:stretch>
+        </p:blipFill>
+        <p:spPr>
+          <a:xfrm>
+            <a:off x="503143" y="4508486"/>
+            <a:ext cx="4356100" cy="685800"/>
+          </a:xfrm>
+          <a:prstGeom prst="rect">
+            <a:avLst/>
+          </a:prstGeom>
+        </p:spPr>
+      </p:pic>
+      <p:pic>
+        <p:nvPicPr>
+          <p:cNvPr id="12" name="Picture 11">
+            <a:extLst>
+              <a:ext uri="{FF2B5EF4-FFF2-40B4-BE49-F238E27FC236}">
+                <a16:creationId xmlns:a16="http://schemas.microsoft.com/office/drawing/2014/main" id="{371019BD-1645-84B1-2B73-48866471DA9A}"/>
+              </a:ext>
+            </a:extLst>
+          </p:cNvPr>
+          <p:cNvPicPr>
+            <a:picLocks noChangeAspect="1"/>
+          </p:cNvPicPr>
+          <p:nvPr/>
+        </p:nvPicPr>
+        <p:blipFill>
+          <a:blip r:embed="rId9"/>
+          <a:stretch>
+            <a:fillRect/>
+          </a:stretch>
+        </p:blipFill>
+        <p:spPr>
+          <a:xfrm>
+            <a:off x="5553443" y="4494729"/>
+            <a:ext cx="6044802" cy="668632"/>
+          </a:xfrm>
+          <a:prstGeom prst="rect">
+            <a:avLst/>
+          </a:prstGeom>
+        </p:spPr>
+      </p:pic>
+      <p:pic>
+        <p:nvPicPr>
+          <p:cNvPr id="14" name="Picture 13">
+            <a:extLst>
+              <a:ext uri="{FF2B5EF4-FFF2-40B4-BE49-F238E27FC236}">
+                <a16:creationId xmlns:a16="http://schemas.microsoft.com/office/drawing/2014/main" id="{3C058EFE-FAEA-E286-C945-AC91AE80FD44}"/>
+              </a:ext>
+            </a:extLst>
+          </p:cNvPr>
+          <p:cNvPicPr>
+            <a:picLocks noChangeAspect="1"/>
+          </p:cNvPicPr>
+          <p:nvPr/>
+        </p:nvPicPr>
+        <p:blipFill>
+          <a:blip r:embed="rId10"/>
+          <a:stretch>
+            <a:fillRect/>
+          </a:stretch>
+        </p:blipFill>
+        <p:spPr>
+          <a:xfrm>
+            <a:off x="503143" y="5405413"/>
+            <a:ext cx="2895600" cy="736600"/>
+          </a:xfrm>
+          <a:prstGeom prst="rect">
+            <a:avLst/>
+          </a:prstGeom>
+        </p:spPr>
+      </p:pic>
+      <p:pic>
+        <p:nvPicPr>
+          <p:cNvPr id="15" name="Picture 14">
+            <a:extLst>
+              <a:ext uri="{FF2B5EF4-FFF2-40B4-BE49-F238E27FC236}">
+                <a16:creationId xmlns:a16="http://schemas.microsoft.com/office/drawing/2014/main" id="{66C322C3-AB3C-6BFC-84A2-B9546D36EDAB}"/>
+              </a:ext>
+            </a:extLst>
+          </p:cNvPr>
+          <p:cNvPicPr>
+            <a:picLocks noChangeAspect="1"/>
+          </p:cNvPicPr>
+          <p:nvPr/>
+        </p:nvPicPr>
+        <p:blipFill>
+          <a:blip r:embed="rId11"/>
+          <a:stretch>
+            <a:fillRect/>
+          </a:stretch>
+        </p:blipFill>
+        <p:spPr>
+          <a:xfrm>
+            <a:off x="5553443" y="5396844"/>
+            <a:ext cx="5879184" cy="617932"/>
+          </a:xfrm>
+          <a:prstGeom prst="rect">
+            <a:avLst/>
+          </a:prstGeom>
+        </p:spPr>
+      </p:pic>
+      <p:sp>
+        <p:nvSpPr>
+          <p:cNvPr id="16" name="TextBox 15">
+            <a:extLst>
+              <a:ext uri="{FF2B5EF4-FFF2-40B4-BE49-F238E27FC236}">
+                <a16:creationId xmlns:a16="http://schemas.microsoft.com/office/drawing/2014/main" id="{7D1E9CF7-E2B9-9B41-8FDD-EC5EF20E794F}"/>
+              </a:ext>
+            </a:extLst>
+          </p:cNvPr>
+          <p:cNvSpPr txBox="1"/>
+          <p:nvPr/>
+        </p:nvSpPr>
+        <p:spPr>
+          <a:xfrm>
+            <a:off x="503143" y="6324176"/>
+            <a:ext cx="4079963" cy="369332"/>
+          </a:xfrm>
+          <a:prstGeom prst="rect">
+            <a:avLst/>
+          </a:prstGeom>
+          <a:noFill/>
+        </p:spPr>
+        <p:txBody>
+          <a:bodyPr wrap="none" rtlCol="0">
+            <a:spAutoFit/>
+          </a:bodyPr>
+          <a:lstStyle/>
+          <a:p>
+            <a:r>
+              <a:rPr lang="en-US" dirty="0"/>
+              <a:t>The methods kind of work but not quite</a:t>
+            </a:r>
+          </a:p>
+        </p:txBody>
+      </p:sp>
+    </p:spTree>
+    <p:extLst>
+      <p:ext uri="{BB962C8B-B14F-4D97-AF65-F5344CB8AC3E}">
+        <p14:creationId xmlns:p14="http://schemas.microsoft.com/office/powerpoint/2010/main" val="3886732968"/>
+      </p:ext>
+    </p:extLst>
+  </p:cSld>
+  <p:clrMapOvr>
+    <a:masterClrMapping/>
+  </p:clrMapOvr>
+</p:sld>
+</file>
+
+<file path=ppt/slides/slide25.xml><?xml version="1.0" encoding="utf-8"?>
+<p:sld xmlns:a="http://schemas.openxmlformats.org/drawingml/2006/main" xmlns:r="http://schemas.openxmlformats.org/officeDocument/2006/relationships" xmlns:p="http://schemas.openxmlformats.org/presentationml/2006/main">
+  <p:cSld>
+    <p:spTree>
+      <p:nvGrpSpPr>
+        <p:cNvPr id="1" name="">
+          <a:extLst>
+            <a:ext uri="{FF2B5EF4-FFF2-40B4-BE49-F238E27FC236}">
+              <a16:creationId xmlns:a16="http://schemas.microsoft.com/office/drawing/2014/main" id="{43043C20-422E-AAE9-0DD7-FE8083B2D8CC}"/>
+            </a:ext>
+          </a:extLst>
+        </p:cNvPr>
+        <p:cNvGrpSpPr/>
+        <p:nvPr/>
+      </p:nvGrpSpPr>
+      <p:grpSpPr>
+        <a:xfrm>
+          <a:off x="0" y="0"/>
+          <a:ext cx="0" cy="0"/>
+          <a:chOff x="0" y="0"/>
+          <a:chExt cx="0" cy="0"/>
+        </a:xfrm>
+      </p:grpSpPr>
+      <p:sp>
+        <p:nvSpPr>
+          <p:cNvPr id="2" name="Title 1">
+            <a:extLst>
+              <a:ext uri="{FF2B5EF4-FFF2-40B4-BE49-F238E27FC236}">
+                <a16:creationId xmlns:a16="http://schemas.microsoft.com/office/drawing/2014/main" id="{964AB875-0BAA-8AA4-5F10-6A4324E51B35}"/>
+              </a:ext>
+            </a:extLst>
+          </p:cNvPr>
+          <p:cNvSpPr>
+            <a:spLocks noGrp="1"/>
+          </p:cNvSpPr>
+          <p:nvPr>
+            <p:ph type="title"/>
+          </p:nvPr>
+        </p:nvSpPr>
+        <p:spPr/>
+        <p:txBody>
+          <a:bodyPr/>
+          <a:lstStyle/>
+          <a:p>
+            <a:r>
+              <a:rPr lang="en-US" dirty="0"/>
+              <a:t>Discontinuous integrals</a:t>
+            </a:r>
+            <a:endParaRPr lang="uk-UA" dirty="0"/>
+          </a:p>
+        </p:txBody>
+      </p:sp>
+      <p:sp>
+        <p:nvSpPr>
+          <p:cNvPr id="7" name="Text Placeholder 6">
+            <a:extLst>
+              <a:ext uri="{FF2B5EF4-FFF2-40B4-BE49-F238E27FC236}">
+                <a16:creationId xmlns:a16="http://schemas.microsoft.com/office/drawing/2014/main" id="{02A97C7E-7860-6907-80FD-3A56556DF4D3}"/>
+              </a:ext>
+            </a:extLst>
+          </p:cNvPr>
+          <p:cNvSpPr>
+            <a:spLocks noGrp="1"/>
+          </p:cNvSpPr>
+          <p:nvPr>
+            <p:ph type="body" sz="quarter" idx="12"/>
+          </p:nvPr>
+        </p:nvSpPr>
+        <p:spPr/>
+        <p:txBody>
+          <a:bodyPr/>
+          <a:lstStyle/>
+          <a:p>
+            <a:endParaRPr lang="en-US"/>
+          </a:p>
+        </p:txBody>
+      </p:sp>
+      <p:sp>
+        <p:nvSpPr>
+          <p:cNvPr id="13" name="TextBox 12">
+            <a:extLst>
+              <a:ext uri="{FF2B5EF4-FFF2-40B4-BE49-F238E27FC236}">
+                <a16:creationId xmlns:a16="http://schemas.microsoft.com/office/drawing/2014/main" id="{E88B5B88-2B7A-15FE-2E0B-1C5F8B988833}"/>
+              </a:ext>
+            </a:extLst>
+          </p:cNvPr>
+          <p:cNvSpPr txBox="1"/>
+          <p:nvPr/>
+        </p:nvSpPr>
+        <p:spPr>
+          <a:xfrm>
+            <a:off x="726712" y="1165086"/>
+            <a:ext cx="8543850" cy="430887"/>
+          </a:xfrm>
+          <a:prstGeom prst="rect">
+            <a:avLst/>
+          </a:prstGeom>
+          <a:noFill/>
+        </p:spPr>
+        <p:txBody>
+          <a:bodyPr wrap="square">
+            <a:spAutoFit/>
+          </a:bodyPr>
+          <a:lstStyle/>
+          <a:p>
+            <a:r>
+              <a:rPr lang="en-US" sz="2200" dirty="0">
+                <a:effectLst/>
+                <a:latin typeface="+mj-lt"/>
+                <a:ea typeface="DejaVu Sans"/>
+              </a:rPr>
+              <a:t>Better strategy: split the integral into two and integrate separately</a:t>
+            </a:r>
+            <a:endParaRPr lang="en-US" sz="2200" i="1" dirty="0">
+              <a:effectLst/>
+              <a:latin typeface="+mj-lt"/>
+              <a:ea typeface="DejaVu Sans"/>
+            </a:endParaRPr>
+          </a:p>
+        </p:txBody>
+      </p:sp>
+      <p:pic>
+        <p:nvPicPr>
+          <p:cNvPr id="4" name="Picture 3">
+            <a:extLst>
+              <a:ext uri="{FF2B5EF4-FFF2-40B4-BE49-F238E27FC236}">
+                <a16:creationId xmlns:a16="http://schemas.microsoft.com/office/drawing/2014/main" id="{18B3F024-D324-9DF8-03DB-BFFAA1E9CCD8}"/>
+              </a:ext>
+            </a:extLst>
+          </p:cNvPr>
+          <p:cNvPicPr>
+            <a:picLocks noChangeAspect="1"/>
+          </p:cNvPicPr>
+          <p:nvPr/>
+        </p:nvPicPr>
+        <p:blipFill>
+          <a:blip r:embed="rId2"/>
+          <a:stretch>
+            <a:fillRect/>
+          </a:stretch>
+        </p:blipFill>
+        <p:spPr>
+          <a:xfrm>
+            <a:off x="726712" y="1980981"/>
+            <a:ext cx="1435100" cy="520700"/>
+          </a:xfrm>
+          <a:prstGeom prst="rect">
+            <a:avLst/>
+          </a:prstGeom>
+        </p:spPr>
+      </p:pic>
+      <p:pic>
+        <p:nvPicPr>
+          <p:cNvPr id="9" name="Picture 8">
+            <a:extLst>
+              <a:ext uri="{FF2B5EF4-FFF2-40B4-BE49-F238E27FC236}">
+                <a16:creationId xmlns:a16="http://schemas.microsoft.com/office/drawing/2014/main" id="{C9B774E0-DD62-04E4-746D-FC4C9AB37A04}"/>
+              </a:ext>
+            </a:extLst>
+          </p:cNvPr>
+          <p:cNvPicPr>
+            <a:picLocks noChangeAspect="1"/>
+          </p:cNvPicPr>
+          <p:nvPr/>
+        </p:nvPicPr>
+        <p:blipFill>
+          <a:blip r:embed="rId3"/>
+          <a:stretch>
+            <a:fillRect/>
+          </a:stretch>
+        </p:blipFill>
+        <p:spPr>
+          <a:xfrm>
+            <a:off x="3413454" y="1847631"/>
+            <a:ext cx="1917700" cy="787400"/>
+          </a:xfrm>
+          <a:prstGeom prst="rect">
+            <a:avLst/>
+          </a:prstGeom>
+        </p:spPr>
+      </p:pic>
+      <p:pic>
+        <p:nvPicPr>
+          <p:cNvPr id="10" name="Picture 9">
+            <a:extLst>
+              <a:ext uri="{FF2B5EF4-FFF2-40B4-BE49-F238E27FC236}">
+                <a16:creationId xmlns:a16="http://schemas.microsoft.com/office/drawing/2014/main" id="{A6DCF6C8-5ED3-F2B5-A604-E14C33046BFE}"/>
+              </a:ext>
+            </a:extLst>
+          </p:cNvPr>
+          <p:cNvPicPr>
+            <a:picLocks noChangeAspect="1"/>
+          </p:cNvPicPr>
+          <p:nvPr/>
+        </p:nvPicPr>
+        <p:blipFill>
+          <a:blip r:embed="rId4"/>
+          <a:stretch>
+            <a:fillRect/>
+          </a:stretch>
+        </p:blipFill>
+        <p:spPr>
+          <a:xfrm>
+            <a:off x="6860848" y="1879381"/>
+            <a:ext cx="1854200" cy="723900"/>
+          </a:xfrm>
+          <a:prstGeom prst="rect">
+            <a:avLst/>
+          </a:prstGeom>
+        </p:spPr>
+      </p:pic>
+      <p:pic>
+        <p:nvPicPr>
+          <p:cNvPr id="11" name="Picture 10">
+            <a:extLst>
+              <a:ext uri="{FF2B5EF4-FFF2-40B4-BE49-F238E27FC236}">
+                <a16:creationId xmlns:a16="http://schemas.microsoft.com/office/drawing/2014/main" id="{1E6D2F17-2A9A-4F9D-1AF0-F14501B2E1A5}"/>
+              </a:ext>
+            </a:extLst>
+          </p:cNvPr>
+          <p:cNvPicPr>
+            <a:picLocks noChangeAspect="1"/>
+          </p:cNvPicPr>
+          <p:nvPr/>
+        </p:nvPicPr>
+        <p:blipFill>
+          <a:blip r:embed="rId5"/>
+          <a:stretch>
+            <a:fillRect/>
+          </a:stretch>
+        </p:blipFill>
+        <p:spPr>
+          <a:xfrm>
+            <a:off x="726712" y="2761058"/>
+            <a:ext cx="4171109" cy="2458864"/>
+          </a:xfrm>
+          <a:prstGeom prst="rect">
+            <a:avLst/>
+          </a:prstGeom>
+        </p:spPr>
+      </p:pic>
+      <p:pic>
+        <p:nvPicPr>
+          <p:cNvPr id="12" name="Picture 11">
+            <a:extLst>
+              <a:ext uri="{FF2B5EF4-FFF2-40B4-BE49-F238E27FC236}">
+                <a16:creationId xmlns:a16="http://schemas.microsoft.com/office/drawing/2014/main" id="{5F3BABE4-C8E1-9432-A707-4D2DE551207F}"/>
+              </a:ext>
+            </a:extLst>
+          </p:cNvPr>
+          <p:cNvPicPr>
+            <a:picLocks noChangeAspect="1"/>
+          </p:cNvPicPr>
+          <p:nvPr/>
+        </p:nvPicPr>
+        <p:blipFill>
+          <a:blip r:embed="rId6"/>
+          <a:stretch>
+            <a:fillRect/>
+          </a:stretch>
+        </p:blipFill>
+        <p:spPr>
+          <a:xfrm>
+            <a:off x="726712" y="5406929"/>
+            <a:ext cx="5013073" cy="1103176"/>
+          </a:xfrm>
+          <a:prstGeom prst="rect">
+            <a:avLst/>
+          </a:prstGeom>
+        </p:spPr>
+      </p:pic>
+      <p:pic>
+        <p:nvPicPr>
+          <p:cNvPr id="14" name="Picture 13">
+            <a:extLst>
+              <a:ext uri="{FF2B5EF4-FFF2-40B4-BE49-F238E27FC236}">
+                <a16:creationId xmlns:a16="http://schemas.microsoft.com/office/drawing/2014/main" id="{2FC40851-E536-34BF-A3EB-F03C97F45DB1}"/>
+              </a:ext>
+            </a:extLst>
+          </p:cNvPr>
+          <p:cNvPicPr>
+            <a:picLocks noChangeAspect="1"/>
+          </p:cNvPicPr>
+          <p:nvPr/>
+        </p:nvPicPr>
+        <p:blipFill>
+          <a:blip r:embed="rId7"/>
+          <a:stretch>
+            <a:fillRect/>
+          </a:stretch>
+        </p:blipFill>
+        <p:spPr>
+          <a:xfrm>
+            <a:off x="6452214" y="2794099"/>
+            <a:ext cx="2827283" cy="2512010"/>
+          </a:xfrm>
+          <a:prstGeom prst="rect">
+            <a:avLst/>
+          </a:prstGeom>
+        </p:spPr>
+      </p:pic>
+      <p:pic>
+        <p:nvPicPr>
+          <p:cNvPr id="15" name="Picture 14">
+            <a:extLst>
+              <a:ext uri="{FF2B5EF4-FFF2-40B4-BE49-F238E27FC236}">
+                <a16:creationId xmlns:a16="http://schemas.microsoft.com/office/drawing/2014/main" id="{9455B37E-0695-F946-93EF-88BA83315446}"/>
+              </a:ext>
+            </a:extLst>
+          </p:cNvPr>
+          <p:cNvPicPr>
+            <a:picLocks noChangeAspect="1"/>
+          </p:cNvPicPr>
+          <p:nvPr/>
+        </p:nvPicPr>
+        <p:blipFill>
+          <a:blip r:embed="rId8"/>
+          <a:stretch>
+            <a:fillRect/>
+          </a:stretch>
+        </p:blipFill>
+        <p:spPr>
+          <a:xfrm>
+            <a:off x="6452214" y="5412800"/>
+            <a:ext cx="5013074" cy="1091435"/>
+          </a:xfrm>
+          <a:prstGeom prst="rect">
+            <a:avLst/>
+          </a:prstGeom>
+        </p:spPr>
+      </p:pic>
+    </p:spTree>
+    <p:extLst>
+      <p:ext uri="{BB962C8B-B14F-4D97-AF65-F5344CB8AC3E}">
+        <p14:creationId xmlns:p14="http://schemas.microsoft.com/office/powerpoint/2010/main" val="2324044906"/>
+      </p:ext>
+    </p:extLst>
+  </p:cSld>
+  <p:clrMapOvr>
+    <a:masterClrMapping/>
+  </p:clrMapOvr>
+</p:sld>
+</file>
+
+<file path=ppt/slides/slide26.xml><?xml version="1.0" encoding="utf-8"?>
+<p:sld xmlns:a="http://schemas.openxmlformats.org/drawingml/2006/main" xmlns:r="http://schemas.openxmlformats.org/officeDocument/2006/relationships" xmlns:p="http://schemas.openxmlformats.org/presentationml/2006/main">
+  <p:cSld>
+    <p:spTree>
+      <p:nvGrpSpPr>
         <p:cNvPr id="1" name=""/>
         <p:cNvGrpSpPr/>
         <p:nvPr/>
@@ -8795,7 +10087,7 @@
 </p:sld>
 </file>
 
-<file path=ppt/slides/slide23.xml><?xml version="1.0" encoding="utf-8"?>
+<file path=ppt/slides/slide27.xml><?xml version="1.0" encoding="utf-8"?>
 <p:sld xmlns:a="http://schemas.openxmlformats.org/drawingml/2006/main" xmlns:r="http://schemas.openxmlformats.org/officeDocument/2006/relationships" xmlns:p="http://schemas.openxmlformats.org/presentationml/2006/main">
   <p:cSld>
     <p:spTree>
@@ -9229,7 +10521,7 @@
 </p:sld>
 </file>
 
-<file path=ppt/slides/slide24.xml><?xml version="1.0" encoding="utf-8"?>
+<file path=ppt/slides/slide28.xml><?xml version="1.0" encoding="utf-8"?>
 <p:sld xmlns:a="http://schemas.openxmlformats.org/drawingml/2006/main" xmlns:r="http://schemas.openxmlformats.org/officeDocument/2006/relationships" xmlns:p="http://schemas.openxmlformats.org/presentationml/2006/main">
   <p:cSld>
     <p:spTree>
@@ -9494,7 +10786,7 @@
 </p:sld>
 </file>
 
-<file path=ppt/slides/slide25.xml><?xml version="1.0" encoding="utf-8"?>
+<file path=ppt/slides/slide29.xml><?xml version="1.0" encoding="utf-8"?>
 <p:sld xmlns:a="http://schemas.openxmlformats.org/drawingml/2006/main" xmlns:r="http://schemas.openxmlformats.org/officeDocument/2006/relationships" xmlns:p="http://schemas.openxmlformats.org/presentationml/2006/main">
   <p:cSld>
     <p:spTree>
@@ -9667,7 +10959,7 @@
 </p:sld>
 </file>
 
-<file path=ppt/slides/slide26.xml><?xml version="1.0" encoding="utf-8"?>
+<file path=ppt/slides/slide3.xml><?xml version="1.0" encoding="utf-8"?>
 <p:sld xmlns:a="http://schemas.openxmlformats.org/drawingml/2006/main" xmlns:r="http://schemas.openxmlformats.org/officeDocument/2006/relationships" xmlns:p="http://schemas.openxmlformats.org/presentationml/2006/main">
   <p:cSld>
     <p:spTree>
@@ -9707,6 +10999,309 @@
           <a:p>
             <a:r>
               <a:rPr lang="en-US" dirty="0"/>
+              <a:t>Numerical integration: rectangular (midpoint) rule</a:t>
+            </a:r>
+            <a:endParaRPr lang="uk-UA" dirty="0"/>
+          </a:p>
+        </p:txBody>
+      </p:sp>
+      <p:sp>
+        <p:nvSpPr>
+          <p:cNvPr id="7" name="Text Placeholder 6">
+            <a:extLst>
+              <a:ext uri="{FF2B5EF4-FFF2-40B4-BE49-F238E27FC236}">
+                <a16:creationId xmlns:a16="http://schemas.microsoft.com/office/drawing/2014/main" id="{90F7CEDE-7B21-7BBD-878D-4DD53818F0B1}"/>
+              </a:ext>
+            </a:extLst>
+          </p:cNvPr>
+          <p:cNvSpPr>
+            <a:spLocks noGrp="1"/>
+          </p:cNvSpPr>
+          <p:nvPr>
+            <p:ph type="body" sz="quarter" idx="12"/>
+          </p:nvPr>
+        </p:nvSpPr>
+        <p:spPr/>
+        <p:txBody>
+          <a:bodyPr/>
+          <a:lstStyle/>
+          <a:p>
+            <a:endParaRPr lang="en-US"/>
+          </a:p>
+        </p:txBody>
+      </p:sp>
+      <p:sp>
+        <p:nvSpPr>
+          <p:cNvPr id="9" name="TextBox 8">
+            <a:extLst>
+              <a:ext uri="{FF2B5EF4-FFF2-40B4-BE49-F238E27FC236}">
+                <a16:creationId xmlns:a16="http://schemas.microsoft.com/office/drawing/2014/main" id="{8EB37F40-9F71-CC67-F12C-95E26145113D}"/>
+              </a:ext>
+            </a:extLst>
+          </p:cNvPr>
+          <p:cNvSpPr txBox="1"/>
+          <p:nvPr/>
+        </p:nvSpPr>
+        <p:spPr>
+          <a:xfrm>
+            <a:off x="906961" y="1154318"/>
+            <a:ext cx="6887210" cy="769441"/>
+          </a:xfrm>
+          <a:prstGeom prst="rect">
+            <a:avLst/>
+          </a:prstGeom>
+          <a:noFill/>
+        </p:spPr>
+        <p:txBody>
+          <a:bodyPr wrap="square">
+            <a:spAutoFit/>
+          </a:bodyPr>
+          <a:lstStyle/>
+          <a:p>
+            <a:r>
+              <a:rPr lang="en-US" sz="2200" dirty="0">
+                <a:latin typeface="+mj-lt"/>
+                <a:ea typeface="DejaVu Sans"/>
+              </a:rPr>
+              <a:t>Interpret the integral as the area under the curve and approximate by a rectangle evaluated at midpoint</a:t>
+            </a:r>
+            <a:endParaRPr lang="en-US" sz="2200" dirty="0">
+              <a:effectLst/>
+              <a:latin typeface="+mj-lt"/>
+              <a:ea typeface="DejaVu Sans"/>
+            </a:endParaRPr>
+          </a:p>
+        </p:txBody>
+      </p:sp>
+      <p:pic>
+        <p:nvPicPr>
+          <p:cNvPr id="8" name="Picture 7">
+            <a:extLst>
+              <a:ext uri="{FF2B5EF4-FFF2-40B4-BE49-F238E27FC236}">
+                <a16:creationId xmlns:a16="http://schemas.microsoft.com/office/drawing/2014/main" id="{D2BB976D-7D7C-2BAC-E587-616E796159E1}"/>
+              </a:ext>
+            </a:extLst>
+          </p:cNvPr>
+          <p:cNvPicPr>
+            <a:picLocks noChangeAspect="1"/>
+          </p:cNvPicPr>
+          <p:nvPr/>
+        </p:nvPicPr>
+        <p:blipFill>
+          <a:blip r:embed="rId2"/>
+          <a:stretch>
+            <a:fillRect/>
+          </a:stretch>
+        </p:blipFill>
+        <p:spPr>
+          <a:xfrm>
+            <a:off x="3939454" y="2068098"/>
+            <a:ext cx="3396965" cy="835761"/>
+          </a:xfrm>
+          <a:prstGeom prst="rect">
+            <a:avLst/>
+          </a:prstGeom>
+        </p:spPr>
+      </p:pic>
+      <p:sp>
+        <p:nvSpPr>
+          <p:cNvPr id="12" name="TextBox 11">
+            <a:extLst>
+              <a:ext uri="{FF2B5EF4-FFF2-40B4-BE49-F238E27FC236}">
+                <a16:creationId xmlns:a16="http://schemas.microsoft.com/office/drawing/2014/main" id="{99B6D718-6252-F787-F867-D290BA68477D}"/>
+              </a:ext>
+            </a:extLst>
+          </p:cNvPr>
+          <p:cNvSpPr txBox="1"/>
+          <p:nvPr/>
+        </p:nvSpPr>
+        <p:spPr>
+          <a:xfrm>
+            <a:off x="933734" y="3213556"/>
+            <a:ext cx="5189040" cy="430887"/>
+          </a:xfrm>
+          <a:prstGeom prst="rect">
+            <a:avLst/>
+          </a:prstGeom>
+          <a:noFill/>
+        </p:spPr>
+        <p:txBody>
+          <a:bodyPr wrap="square">
+            <a:spAutoFit/>
+          </a:bodyPr>
+          <a:lstStyle/>
+          <a:p>
+            <a:r>
+              <a:rPr lang="en-US" sz="2200" dirty="0">
+                <a:latin typeface="+mj-lt"/>
+                <a:ea typeface="DejaVu Sans"/>
+              </a:rPr>
+              <a:t>Error (from Euler-McLaurin formula):</a:t>
+            </a:r>
+            <a:endParaRPr lang="en-US" sz="2200" dirty="0">
+              <a:effectLst/>
+              <a:latin typeface="+mj-lt"/>
+              <a:ea typeface="DejaVu Sans"/>
+            </a:endParaRPr>
+          </a:p>
+        </p:txBody>
+      </p:sp>
+      <p:pic>
+        <p:nvPicPr>
+          <p:cNvPr id="14" name="Picture 13">
+            <a:extLst>
+              <a:ext uri="{FF2B5EF4-FFF2-40B4-BE49-F238E27FC236}">
+                <a16:creationId xmlns:a16="http://schemas.microsoft.com/office/drawing/2014/main" id="{7E3D3202-7D25-FF2C-AF3B-44472875434A}"/>
+              </a:ext>
+            </a:extLst>
+          </p:cNvPr>
+          <p:cNvPicPr>
+            <a:picLocks noChangeAspect="1"/>
+          </p:cNvPicPr>
+          <p:nvPr/>
+        </p:nvPicPr>
+        <p:blipFill>
+          <a:blip r:embed="rId3"/>
+          <a:stretch>
+            <a:fillRect/>
+          </a:stretch>
+        </p:blipFill>
+        <p:spPr>
+          <a:xfrm>
+            <a:off x="8707315" y="1509140"/>
+            <a:ext cx="2771763" cy="2065612"/>
+          </a:xfrm>
+          <a:prstGeom prst="rect">
+            <a:avLst/>
+          </a:prstGeom>
+        </p:spPr>
+      </p:pic>
+      <p:pic>
+        <p:nvPicPr>
+          <p:cNvPr id="15" name="Picture 14">
+            <a:extLst>
+              <a:ext uri="{FF2B5EF4-FFF2-40B4-BE49-F238E27FC236}">
+                <a16:creationId xmlns:a16="http://schemas.microsoft.com/office/drawing/2014/main" id="{3A7BF017-B9BE-18CE-9C9A-EE95E4C94267}"/>
+              </a:ext>
+            </a:extLst>
+          </p:cNvPr>
+          <p:cNvPicPr>
+            <a:picLocks noChangeAspect="1"/>
+          </p:cNvPicPr>
+          <p:nvPr/>
+        </p:nvPicPr>
+        <p:blipFill>
+          <a:blip r:embed="rId4"/>
+          <a:stretch>
+            <a:fillRect/>
+          </a:stretch>
+        </p:blipFill>
+        <p:spPr>
+          <a:xfrm>
+            <a:off x="3714505" y="3954140"/>
+            <a:ext cx="4816538" cy="706775"/>
+          </a:xfrm>
+          <a:prstGeom prst="rect">
+            <a:avLst/>
+          </a:prstGeom>
+        </p:spPr>
+      </p:pic>
+      <p:sp>
+        <p:nvSpPr>
+          <p:cNvPr id="16" name="TextBox 15">
+            <a:extLst>
+              <a:ext uri="{FF2B5EF4-FFF2-40B4-BE49-F238E27FC236}">
+                <a16:creationId xmlns:a16="http://schemas.microsoft.com/office/drawing/2014/main" id="{6665DCCF-405E-E161-AC2E-5A1356163FB3}"/>
+              </a:ext>
+            </a:extLst>
+          </p:cNvPr>
+          <p:cNvSpPr txBox="1"/>
+          <p:nvPr/>
+        </p:nvSpPr>
+        <p:spPr>
+          <a:xfrm>
+            <a:off x="906959" y="4970612"/>
+            <a:ext cx="7193488" cy="430887"/>
+          </a:xfrm>
+          <a:prstGeom prst="rect">
+            <a:avLst/>
+          </a:prstGeom>
+          <a:noFill/>
+        </p:spPr>
+        <p:txBody>
+          <a:bodyPr wrap="square">
+            <a:spAutoFit/>
+          </a:bodyPr>
+          <a:lstStyle/>
+          <a:p>
+            <a:r>
+              <a:rPr lang="en-US" sz="2200" dirty="0">
+                <a:latin typeface="+mj-lt"/>
+                <a:ea typeface="DejaVu Sans"/>
+              </a:rPr>
+              <a:t>The rule is exact for the integration of linear functions</a:t>
+            </a:r>
+            <a:endParaRPr lang="en-US" sz="2200" dirty="0">
+              <a:effectLst/>
+              <a:latin typeface="+mj-lt"/>
+              <a:ea typeface="DejaVu Sans"/>
+            </a:endParaRPr>
+          </a:p>
+        </p:txBody>
+      </p:sp>
+    </p:spTree>
+    <p:extLst>
+      <p:ext uri="{BB962C8B-B14F-4D97-AF65-F5344CB8AC3E}">
+        <p14:creationId xmlns:p14="http://schemas.microsoft.com/office/powerpoint/2010/main" val="182696880"/>
+      </p:ext>
+    </p:extLst>
+  </p:cSld>
+  <p:clrMapOvr>
+    <a:masterClrMapping/>
+  </p:clrMapOvr>
+</p:sld>
+</file>
+
+<file path=ppt/slides/slide30.xml><?xml version="1.0" encoding="utf-8"?>
+<p:sld xmlns:a="http://schemas.openxmlformats.org/drawingml/2006/main" xmlns:r="http://schemas.openxmlformats.org/officeDocument/2006/relationships" xmlns:p="http://schemas.openxmlformats.org/presentationml/2006/main">
+  <p:cSld>
+    <p:spTree>
+      <p:nvGrpSpPr>
+        <p:cNvPr id="1" name=""/>
+        <p:cNvGrpSpPr/>
+        <p:nvPr/>
+      </p:nvGrpSpPr>
+      <p:grpSpPr>
+        <a:xfrm>
+          <a:off x="0" y="0"/>
+          <a:ext cx="0" cy="0"/>
+          <a:chOff x="0" y="0"/>
+          <a:chExt cx="0" cy="0"/>
+        </a:xfrm>
+      </p:grpSpPr>
+      <p:sp>
+        <p:nvSpPr>
+          <p:cNvPr id="2" name="Title 1">
+            <a:extLst>
+              <a:ext uri="{FF2B5EF4-FFF2-40B4-BE49-F238E27FC236}">
+                <a16:creationId xmlns:a16="http://schemas.microsoft.com/office/drawing/2014/main" id="{D2AAFA58-9F0A-4217-B38D-E58CFC4CAD2A}"/>
+              </a:ext>
+            </a:extLst>
+          </p:cNvPr>
+          <p:cNvSpPr>
+            <a:spLocks noGrp="1"/>
+          </p:cNvSpPr>
+          <p:nvPr>
+            <p:ph type="title"/>
+          </p:nvPr>
+        </p:nvSpPr>
+        <p:spPr/>
+        <p:txBody>
+          <a:bodyPr/>
+          <a:lstStyle/>
+          <a:p>
+            <a:r>
+              <a:rPr lang="en-US" dirty="0"/>
               <a:t>Improper integrals: (Semi-)infinite intervals</a:t>
             </a:r>
             <a:endParaRPr lang="uk-UA" dirty="0"/>
@@ -10313,8 +11908,8 @@
           </a:p>
         </p:txBody>
       </p:sp>
-      <mc:AlternateContent xmlns:mc="http://schemas.openxmlformats.org/markup-compatibility/2006">
-        <mc:Choice xmlns:a14="http://schemas.microsoft.com/office/drawing/2010/main" Requires="a14">
+      <mc:AlternateContent xmlns:mc="http://schemas.openxmlformats.org/markup-compatibility/2006" xmlns:a14="http://schemas.microsoft.com/office/drawing/2010/main">
+        <mc:Choice Requires="a14">
           <p:sp>
             <p:nvSpPr>
               <p:cNvPr id="3" name="TextBox 2">
@@ -10345,6 +11940,7 @@
               </a:bodyPr>
               <a:lstStyle/>
               <a:p>
+                <a:pPr/>
                 <a14:m>
                   <m:oMathPara xmlns:m="http://schemas.openxmlformats.org/officeDocument/2006/math">
                     <m:oMathParaPr>
@@ -10396,7 +11992,7 @@
             </p:txBody>
           </p:sp>
         </mc:Choice>
-        <mc:Fallback>
+        <mc:Fallback xmlns="">
           <p:sp>
             <p:nvSpPr>
               <p:cNvPr id="3" name="TextBox 2">
@@ -10454,7 +12050,7 @@
 </p:sld>
 </file>
 
-<file path=ppt/slides/slide27.xml><?xml version="1.0" encoding="utf-8"?>
+<file path=ppt/slides/slide31.xml><?xml version="1.0" encoding="utf-8"?>
 <p:sld xmlns:a="http://schemas.openxmlformats.org/drawingml/2006/main" xmlns:r="http://schemas.openxmlformats.org/officeDocument/2006/relationships" xmlns:p="http://schemas.openxmlformats.org/presentationml/2006/main">
   <p:cSld>
     <p:spTree>
@@ -10598,7 +12194,7 @@
 </p:sld>
 </file>
 
-<file path=ppt/slides/slide28.xml><?xml version="1.0" encoding="utf-8"?>
+<file path=ppt/slides/slide32.xml><?xml version="1.0" encoding="utf-8"?>
 <p:sld xmlns:a="http://schemas.openxmlformats.org/drawingml/2006/main" xmlns:r="http://schemas.openxmlformats.org/officeDocument/2006/relationships" xmlns:p="http://schemas.openxmlformats.org/presentationml/2006/main">
   <p:cSld>
     <p:spTree>
@@ -10733,309 +12329,6 @@
     <p:extLst>
       <p:ext uri="{BB962C8B-B14F-4D97-AF65-F5344CB8AC3E}">
         <p14:creationId xmlns:p14="http://schemas.microsoft.com/office/powerpoint/2010/main" val="1318950106"/>
-      </p:ext>
-    </p:extLst>
-  </p:cSld>
-  <p:clrMapOvr>
-    <a:masterClrMapping/>
-  </p:clrMapOvr>
-</p:sld>
-</file>
-
-<file path=ppt/slides/slide3.xml><?xml version="1.0" encoding="utf-8"?>
-<p:sld xmlns:a="http://schemas.openxmlformats.org/drawingml/2006/main" xmlns:r="http://schemas.openxmlformats.org/officeDocument/2006/relationships" xmlns:p="http://schemas.openxmlformats.org/presentationml/2006/main">
-  <p:cSld>
-    <p:spTree>
-      <p:nvGrpSpPr>
-        <p:cNvPr id="1" name=""/>
-        <p:cNvGrpSpPr/>
-        <p:nvPr/>
-      </p:nvGrpSpPr>
-      <p:grpSpPr>
-        <a:xfrm>
-          <a:off x="0" y="0"/>
-          <a:ext cx="0" cy="0"/>
-          <a:chOff x="0" y="0"/>
-          <a:chExt cx="0" cy="0"/>
-        </a:xfrm>
-      </p:grpSpPr>
-      <p:sp>
-        <p:nvSpPr>
-          <p:cNvPr id="2" name="Title 1">
-            <a:extLst>
-              <a:ext uri="{FF2B5EF4-FFF2-40B4-BE49-F238E27FC236}">
-                <a16:creationId xmlns:a16="http://schemas.microsoft.com/office/drawing/2014/main" id="{D2AAFA58-9F0A-4217-B38D-E58CFC4CAD2A}"/>
-              </a:ext>
-            </a:extLst>
-          </p:cNvPr>
-          <p:cNvSpPr>
-            <a:spLocks noGrp="1"/>
-          </p:cNvSpPr>
-          <p:nvPr>
-            <p:ph type="title"/>
-          </p:nvPr>
-        </p:nvSpPr>
-        <p:spPr/>
-        <p:txBody>
-          <a:bodyPr/>
-          <a:lstStyle/>
-          <a:p>
-            <a:r>
-              <a:rPr lang="en-US" dirty="0"/>
-              <a:t>Numerical integration: rectangular (midpoint) rule</a:t>
-            </a:r>
-            <a:endParaRPr lang="uk-UA" dirty="0"/>
-          </a:p>
-        </p:txBody>
-      </p:sp>
-      <p:sp>
-        <p:nvSpPr>
-          <p:cNvPr id="7" name="Text Placeholder 6">
-            <a:extLst>
-              <a:ext uri="{FF2B5EF4-FFF2-40B4-BE49-F238E27FC236}">
-                <a16:creationId xmlns:a16="http://schemas.microsoft.com/office/drawing/2014/main" id="{90F7CEDE-7B21-7BBD-878D-4DD53818F0B1}"/>
-              </a:ext>
-            </a:extLst>
-          </p:cNvPr>
-          <p:cNvSpPr>
-            <a:spLocks noGrp="1"/>
-          </p:cNvSpPr>
-          <p:nvPr>
-            <p:ph type="body" sz="quarter" idx="12"/>
-          </p:nvPr>
-        </p:nvSpPr>
-        <p:spPr/>
-        <p:txBody>
-          <a:bodyPr/>
-          <a:lstStyle/>
-          <a:p>
-            <a:endParaRPr lang="en-US"/>
-          </a:p>
-        </p:txBody>
-      </p:sp>
-      <p:sp>
-        <p:nvSpPr>
-          <p:cNvPr id="9" name="TextBox 8">
-            <a:extLst>
-              <a:ext uri="{FF2B5EF4-FFF2-40B4-BE49-F238E27FC236}">
-                <a16:creationId xmlns:a16="http://schemas.microsoft.com/office/drawing/2014/main" id="{8EB37F40-9F71-CC67-F12C-95E26145113D}"/>
-              </a:ext>
-            </a:extLst>
-          </p:cNvPr>
-          <p:cNvSpPr txBox="1"/>
-          <p:nvPr/>
-        </p:nvSpPr>
-        <p:spPr>
-          <a:xfrm>
-            <a:off x="906961" y="1154318"/>
-            <a:ext cx="6887210" cy="769441"/>
-          </a:xfrm>
-          <a:prstGeom prst="rect">
-            <a:avLst/>
-          </a:prstGeom>
-          <a:noFill/>
-        </p:spPr>
-        <p:txBody>
-          <a:bodyPr wrap="square">
-            <a:spAutoFit/>
-          </a:bodyPr>
-          <a:lstStyle/>
-          <a:p>
-            <a:r>
-              <a:rPr lang="en-US" sz="2200" dirty="0">
-                <a:latin typeface="+mj-lt"/>
-                <a:ea typeface="DejaVu Sans"/>
-              </a:rPr>
-              <a:t>Interpret the integral as the area under the curve and approximate by a rectangle evaluated at midpoint</a:t>
-            </a:r>
-            <a:endParaRPr lang="en-US" sz="2200" dirty="0">
-              <a:effectLst/>
-              <a:latin typeface="+mj-lt"/>
-              <a:ea typeface="DejaVu Sans"/>
-            </a:endParaRPr>
-          </a:p>
-        </p:txBody>
-      </p:sp>
-      <p:pic>
-        <p:nvPicPr>
-          <p:cNvPr id="8" name="Picture 7">
-            <a:extLst>
-              <a:ext uri="{FF2B5EF4-FFF2-40B4-BE49-F238E27FC236}">
-                <a16:creationId xmlns:a16="http://schemas.microsoft.com/office/drawing/2014/main" id="{D2BB976D-7D7C-2BAC-E587-616E796159E1}"/>
-              </a:ext>
-            </a:extLst>
-          </p:cNvPr>
-          <p:cNvPicPr>
-            <a:picLocks noChangeAspect="1"/>
-          </p:cNvPicPr>
-          <p:nvPr/>
-        </p:nvPicPr>
-        <p:blipFill>
-          <a:blip r:embed="rId2"/>
-          <a:stretch>
-            <a:fillRect/>
-          </a:stretch>
-        </p:blipFill>
-        <p:spPr>
-          <a:xfrm>
-            <a:off x="3939454" y="2068098"/>
-            <a:ext cx="3396965" cy="835761"/>
-          </a:xfrm>
-          <a:prstGeom prst="rect">
-            <a:avLst/>
-          </a:prstGeom>
-        </p:spPr>
-      </p:pic>
-      <p:sp>
-        <p:nvSpPr>
-          <p:cNvPr id="12" name="TextBox 11">
-            <a:extLst>
-              <a:ext uri="{FF2B5EF4-FFF2-40B4-BE49-F238E27FC236}">
-                <a16:creationId xmlns:a16="http://schemas.microsoft.com/office/drawing/2014/main" id="{99B6D718-6252-F787-F867-D290BA68477D}"/>
-              </a:ext>
-            </a:extLst>
-          </p:cNvPr>
-          <p:cNvSpPr txBox="1"/>
-          <p:nvPr/>
-        </p:nvSpPr>
-        <p:spPr>
-          <a:xfrm>
-            <a:off x="933734" y="3213556"/>
-            <a:ext cx="5189040" cy="430887"/>
-          </a:xfrm>
-          <a:prstGeom prst="rect">
-            <a:avLst/>
-          </a:prstGeom>
-          <a:noFill/>
-        </p:spPr>
-        <p:txBody>
-          <a:bodyPr wrap="square">
-            <a:spAutoFit/>
-          </a:bodyPr>
-          <a:lstStyle/>
-          <a:p>
-            <a:r>
-              <a:rPr lang="en-US" sz="2200" dirty="0">
-                <a:latin typeface="+mj-lt"/>
-                <a:ea typeface="DejaVu Sans"/>
-              </a:rPr>
-              <a:t>Error (from Euler-McLaurin formula):</a:t>
-            </a:r>
-            <a:endParaRPr lang="en-US" sz="2200" dirty="0">
-              <a:effectLst/>
-              <a:latin typeface="+mj-lt"/>
-              <a:ea typeface="DejaVu Sans"/>
-            </a:endParaRPr>
-          </a:p>
-        </p:txBody>
-      </p:sp>
-      <p:pic>
-        <p:nvPicPr>
-          <p:cNvPr id="14" name="Picture 13">
-            <a:extLst>
-              <a:ext uri="{FF2B5EF4-FFF2-40B4-BE49-F238E27FC236}">
-                <a16:creationId xmlns:a16="http://schemas.microsoft.com/office/drawing/2014/main" id="{7E3D3202-7D25-FF2C-AF3B-44472875434A}"/>
-              </a:ext>
-            </a:extLst>
-          </p:cNvPr>
-          <p:cNvPicPr>
-            <a:picLocks noChangeAspect="1"/>
-          </p:cNvPicPr>
-          <p:nvPr/>
-        </p:nvPicPr>
-        <p:blipFill>
-          <a:blip r:embed="rId3"/>
-          <a:stretch>
-            <a:fillRect/>
-          </a:stretch>
-        </p:blipFill>
-        <p:spPr>
-          <a:xfrm>
-            <a:off x="8707315" y="1509140"/>
-            <a:ext cx="2771763" cy="2065612"/>
-          </a:xfrm>
-          <a:prstGeom prst="rect">
-            <a:avLst/>
-          </a:prstGeom>
-        </p:spPr>
-      </p:pic>
-      <p:pic>
-        <p:nvPicPr>
-          <p:cNvPr id="15" name="Picture 14">
-            <a:extLst>
-              <a:ext uri="{FF2B5EF4-FFF2-40B4-BE49-F238E27FC236}">
-                <a16:creationId xmlns:a16="http://schemas.microsoft.com/office/drawing/2014/main" id="{3A7BF017-B9BE-18CE-9C9A-EE95E4C94267}"/>
-              </a:ext>
-            </a:extLst>
-          </p:cNvPr>
-          <p:cNvPicPr>
-            <a:picLocks noChangeAspect="1"/>
-          </p:cNvPicPr>
-          <p:nvPr/>
-        </p:nvPicPr>
-        <p:blipFill>
-          <a:blip r:embed="rId4"/>
-          <a:stretch>
-            <a:fillRect/>
-          </a:stretch>
-        </p:blipFill>
-        <p:spPr>
-          <a:xfrm>
-            <a:off x="3714505" y="3954140"/>
-            <a:ext cx="4816538" cy="706775"/>
-          </a:xfrm>
-          <a:prstGeom prst="rect">
-            <a:avLst/>
-          </a:prstGeom>
-        </p:spPr>
-      </p:pic>
-      <p:sp>
-        <p:nvSpPr>
-          <p:cNvPr id="16" name="TextBox 15">
-            <a:extLst>
-              <a:ext uri="{FF2B5EF4-FFF2-40B4-BE49-F238E27FC236}">
-                <a16:creationId xmlns:a16="http://schemas.microsoft.com/office/drawing/2014/main" id="{6665DCCF-405E-E161-AC2E-5A1356163FB3}"/>
-              </a:ext>
-            </a:extLst>
-          </p:cNvPr>
-          <p:cNvSpPr txBox="1"/>
-          <p:nvPr/>
-        </p:nvSpPr>
-        <p:spPr>
-          <a:xfrm>
-            <a:off x="906959" y="4970612"/>
-            <a:ext cx="7193488" cy="430887"/>
-          </a:xfrm>
-          <a:prstGeom prst="rect">
-            <a:avLst/>
-          </a:prstGeom>
-          <a:noFill/>
-        </p:spPr>
-        <p:txBody>
-          <a:bodyPr wrap="square">
-            <a:spAutoFit/>
-          </a:bodyPr>
-          <a:lstStyle/>
-          <a:p>
-            <a:r>
-              <a:rPr lang="en-US" sz="2200" dirty="0">
-                <a:latin typeface="+mj-lt"/>
-                <a:ea typeface="DejaVu Sans"/>
-              </a:rPr>
-              <a:t>The rule is exact for the integration of linear functions</a:t>
-            </a:r>
-            <a:endParaRPr lang="en-US" sz="2200" dirty="0">
-              <a:effectLst/>
-              <a:latin typeface="+mj-lt"/>
-              <a:ea typeface="DejaVu Sans"/>
-            </a:endParaRPr>
-          </a:p>
-        </p:txBody>
-      </p:sp>
-    </p:spTree>
-    <p:extLst>
-      <p:ext uri="{BB962C8B-B14F-4D97-AF65-F5344CB8AC3E}">
-        <p14:creationId xmlns:p14="http://schemas.microsoft.com/office/powerpoint/2010/main" val="182696880"/>
       </p:ext>
     </p:extLst>
   </p:cSld>

</xml_diff>

<commit_message>
Add Lecture 10 materials on Numerical Differentiation and update related files
</commit_message>
<xml_diff>
--- a/slides/Lecture8-02-11-25-NumericalIntegration.pptx
+++ b/slides/Lecture8-02-11-25-NumericalIntegration.pptx
@@ -29,11 +29,11 @@
     <p:sldId id="866" r:id="rId20"/>
     <p:sldId id="867" r:id="rId21"/>
     <p:sldId id="868" r:id="rId22"/>
-    <p:sldId id="876" r:id="rId23"/>
-    <p:sldId id="879" r:id="rId24"/>
-    <p:sldId id="877" r:id="rId25"/>
-    <p:sldId id="878" r:id="rId26"/>
-    <p:sldId id="869" r:id="rId27"/>
+    <p:sldId id="869" r:id="rId23"/>
+    <p:sldId id="876" r:id="rId24"/>
+    <p:sldId id="879" r:id="rId25"/>
+    <p:sldId id="877" r:id="rId26"/>
+    <p:sldId id="878" r:id="rId27"/>
     <p:sldId id="870" r:id="rId28"/>
     <p:sldId id="871" r:id="rId29"/>
     <p:sldId id="872" r:id="rId30"/>
@@ -164,11 +164,11 @@
             <p14:sldId id="866"/>
             <p14:sldId id="867"/>
             <p14:sldId id="868"/>
+            <p14:sldId id="869"/>
             <p14:sldId id="876"/>
             <p14:sldId id="879"/>
             <p14:sldId id="877"/>
             <p14:sldId id="878"/>
-            <p14:sldId id="869"/>
             <p14:sldId id="870"/>
             <p14:sldId id="871"/>
             <p14:sldId id="872"/>
@@ -8664,6 +8664,150 @@
   <p:cSld>
     <p:spTree>
       <p:nvGrpSpPr>
+        <p:cNvPr id="1" name=""/>
+        <p:cNvGrpSpPr/>
+        <p:nvPr/>
+      </p:nvGrpSpPr>
+      <p:grpSpPr>
+        <a:xfrm>
+          <a:off x="0" y="0"/>
+          <a:ext cx="0" cy="0"/>
+          <a:chOff x="0" y="0"/>
+          <a:chExt cx="0" cy="0"/>
+        </a:xfrm>
+      </p:grpSpPr>
+      <p:sp>
+        <p:nvSpPr>
+          <p:cNvPr id="2" name="Title 1">
+            <a:extLst>
+              <a:ext uri="{FF2B5EF4-FFF2-40B4-BE49-F238E27FC236}">
+                <a16:creationId xmlns:a16="http://schemas.microsoft.com/office/drawing/2014/main" id="{D2AAFA58-9F0A-4217-B38D-E58CFC4CAD2A}"/>
+              </a:ext>
+            </a:extLst>
+          </p:cNvPr>
+          <p:cNvSpPr>
+            <a:spLocks noGrp="1"/>
+          </p:cNvSpPr>
+          <p:nvPr>
+            <p:ph type="title"/>
+          </p:nvPr>
+        </p:nvSpPr>
+        <p:spPr/>
+        <p:txBody>
+          <a:bodyPr/>
+          <a:lstStyle/>
+          <a:p>
+            <a:r>
+              <a:rPr lang="en-US" dirty="0"/>
+              <a:t>Romberg method</a:t>
+            </a:r>
+            <a:endParaRPr lang="uk-UA" dirty="0"/>
+          </a:p>
+        </p:txBody>
+      </p:sp>
+      <p:sp>
+        <p:nvSpPr>
+          <p:cNvPr id="7" name="Text Placeholder 6">
+            <a:extLst>
+              <a:ext uri="{FF2B5EF4-FFF2-40B4-BE49-F238E27FC236}">
+                <a16:creationId xmlns:a16="http://schemas.microsoft.com/office/drawing/2014/main" id="{90F7CEDE-7B21-7BBD-878D-4DD53818F0B1}"/>
+              </a:ext>
+            </a:extLst>
+          </p:cNvPr>
+          <p:cNvSpPr>
+            <a:spLocks noGrp="1"/>
+          </p:cNvSpPr>
+          <p:nvPr>
+            <p:ph type="body" sz="quarter" idx="12"/>
+          </p:nvPr>
+        </p:nvSpPr>
+        <p:spPr/>
+        <p:txBody>
+          <a:bodyPr/>
+          <a:lstStyle/>
+          <a:p>
+            <a:endParaRPr lang="en-US"/>
+          </a:p>
+        </p:txBody>
+      </p:sp>
+      <p:pic>
+        <p:nvPicPr>
+          <p:cNvPr id="4" name="Picture 3">
+            <a:extLst>
+              <a:ext uri="{FF2B5EF4-FFF2-40B4-BE49-F238E27FC236}">
+                <a16:creationId xmlns:a16="http://schemas.microsoft.com/office/drawing/2014/main" id="{FD7BA6F5-CD36-134F-BA44-9E28BDF63956}"/>
+              </a:ext>
+            </a:extLst>
+          </p:cNvPr>
+          <p:cNvPicPr>
+            <a:picLocks noChangeAspect="1"/>
+          </p:cNvPicPr>
+          <p:nvPr/>
+        </p:nvPicPr>
+        <p:blipFill>
+          <a:blip r:embed="rId2"/>
+          <a:stretch>
+            <a:fillRect/>
+          </a:stretch>
+        </p:blipFill>
+        <p:spPr>
+          <a:xfrm>
+            <a:off x="703000" y="1220213"/>
+            <a:ext cx="9163844" cy="4179932"/>
+          </a:xfrm>
+          <a:prstGeom prst="rect">
+            <a:avLst/>
+          </a:prstGeom>
+        </p:spPr>
+      </p:pic>
+      <p:pic>
+        <p:nvPicPr>
+          <p:cNvPr id="8" name="Picture 7">
+            <a:extLst>
+              <a:ext uri="{FF2B5EF4-FFF2-40B4-BE49-F238E27FC236}">
+                <a16:creationId xmlns:a16="http://schemas.microsoft.com/office/drawing/2014/main" id="{E3BB72C0-807C-2C88-CDF9-6A3C7E14EA7D}"/>
+              </a:ext>
+            </a:extLst>
+          </p:cNvPr>
+          <p:cNvPicPr>
+            <a:picLocks noChangeAspect="1"/>
+          </p:cNvPicPr>
+          <p:nvPr/>
+        </p:nvPicPr>
+        <p:blipFill>
+          <a:blip r:embed="rId3"/>
+          <a:stretch>
+            <a:fillRect/>
+          </a:stretch>
+        </p:blipFill>
+        <p:spPr>
+          <a:xfrm>
+            <a:off x="703000" y="5754759"/>
+            <a:ext cx="6839543" cy="712532"/>
+          </a:xfrm>
+          <a:prstGeom prst="rect">
+            <a:avLst/>
+          </a:prstGeom>
+        </p:spPr>
+      </p:pic>
+    </p:spTree>
+    <p:extLst>
+      <p:ext uri="{BB962C8B-B14F-4D97-AF65-F5344CB8AC3E}">
+        <p14:creationId xmlns:p14="http://schemas.microsoft.com/office/powerpoint/2010/main" val="3119456792"/>
+      </p:ext>
+    </p:extLst>
+  </p:cSld>
+  <p:clrMapOvr>
+    <a:masterClrMapping/>
+  </p:clrMapOvr>
+</p:sld>
+</file>
+
+<file path=ppt/slides/slide23.xml><?xml version="1.0" encoding="utf-8"?>
+<p:sld xmlns:a="http://schemas.openxmlformats.org/drawingml/2006/main" xmlns:r="http://schemas.openxmlformats.org/officeDocument/2006/relationships" xmlns:p="http://schemas.openxmlformats.org/presentationml/2006/main">
+  <p:cSld>
+    <p:spTree>
+      <p:nvGrpSpPr>
         <p:cNvPr id="1" name="">
           <a:extLst>
             <a:ext uri="{FF2B5EF4-FFF2-40B4-BE49-F238E27FC236}">
@@ -8930,7 +9074,7 @@
 </p:sld>
 </file>
 
-<file path=ppt/slides/slide23.xml><?xml version="1.0" encoding="utf-8"?>
+<file path=ppt/slides/slide24.xml><?xml version="1.0" encoding="utf-8"?>
 <p:sld xmlns:a="http://schemas.openxmlformats.org/drawingml/2006/main" xmlns:r="http://schemas.openxmlformats.org/officeDocument/2006/relationships" xmlns:p="http://schemas.openxmlformats.org/presentationml/2006/main">
   <p:cSld>
     <p:spTree>
@@ -9174,7 +9318,7 @@
 </p:sld>
 </file>
 
-<file path=ppt/slides/slide24.xml><?xml version="1.0" encoding="utf-8"?>
+<file path=ppt/slides/slide25.xml><?xml version="1.0" encoding="utf-8"?>
 <p:sld xmlns:a="http://schemas.openxmlformats.org/drawingml/2006/main" xmlns:r="http://schemas.openxmlformats.org/officeDocument/2006/relationships" xmlns:p="http://schemas.openxmlformats.org/presentationml/2006/main">
   <p:cSld>
     <p:spTree>
@@ -9599,7 +9743,7 @@
 </p:sld>
 </file>
 
-<file path=ppt/slides/slide25.xml><?xml version="1.0" encoding="utf-8"?>
+<file path=ppt/slides/slide26.xml><?xml version="1.0" encoding="utf-8"?>
 <p:sld xmlns:a="http://schemas.openxmlformats.org/drawingml/2006/main" xmlns:r="http://schemas.openxmlformats.org/officeDocument/2006/relationships" xmlns:p="http://schemas.openxmlformats.org/presentationml/2006/main">
   <p:cSld>
     <p:spTree>
@@ -9934,150 +10078,6 @@
     <p:extLst>
       <p:ext uri="{BB962C8B-B14F-4D97-AF65-F5344CB8AC3E}">
         <p14:creationId xmlns:p14="http://schemas.microsoft.com/office/powerpoint/2010/main" val="2324044906"/>
-      </p:ext>
-    </p:extLst>
-  </p:cSld>
-  <p:clrMapOvr>
-    <a:masterClrMapping/>
-  </p:clrMapOvr>
-</p:sld>
-</file>
-
-<file path=ppt/slides/slide26.xml><?xml version="1.0" encoding="utf-8"?>
-<p:sld xmlns:a="http://schemas.openxmlformats.org/drawingml/2006/main" xmlns:r="http://schemas.openxmlformats.org/officeDocument/2006/relationships" xmlns:p="http://schemas.openxmlformats.org/presentationml/2006/main">
-  <p:cSld>
-    <p:spTree>
-      <p:nvGrpSpPr>
-        <p:cNvPr id="1" name=""/>
-        <p:cNvGrpSpPr/>
-        <p:nvPr/>
-      </p:nvGrpSpPr>
-      <p:grpSpPr>
-        <a:xfrm>
-          <a:off x="0" y="0"/>
-          <a:ext cx="0" cy="0"/>
-          <a:chOff x="0" y="0"/>
-          <a:chExt cx="0" cy="0"/>
-        </a:xfrm>
-      </p:grpSpPr>
-      <p:sp>
-        <p:nvSpPr>
-          <p:cNvPr id="2" name="Title 1">
-            <a:extLst>
-              <a:ext uri="{FF2B5EF4-FFF2-40B4-BE49-F238E27FC236}">
-                <a16:creationId xmlns:a16="http://schemas.microsoft.com/office/drawing/2014/main" id="{D2AAFA58-9F0A-4217-B38D-E58CFC4CAD2A}"/>
-              </a:ext>
-            </a:extLst>
-          </p:cNvPr>
-          <p:cNvSpPr>
-            <a:spLocks noGrp="1"/>
-          </p:cNvSpPr>
-          <p:nvPr>
-            <p:ph type="title"/>
-          </p:nvPr>
-        </p:nvSpPr>
-        <p:spPr/>
-        <p:txBody>
-          <a:bodyPr/>
-          <a:lstStyle/>
-          <a:p>
-            <a:r>
-              <a:rPr lang="en-US" dirty="0"/>
-              <a:t>Romberg method</a:t>
-            </a:r>
-            <a:endParaRPr lang="uk-UA" dirty="0"/>
-          </a:p>
-        </p:txBody>
-      </p:sp>
-      <p:sp>
-        <p:nvSpPr>
-          <p:cNvPr id="7" name="Text Placeholder 6">
-            <a:extLst>
-              <a:ext uri="{FF2B5EF4-FFF2-40B4-BE49-F238E27FC236}">
-                <a16:creationId xmlns:a16="http://schemas.microsoft.com/office/drawing/2014/main" id="{90F7CEDE-7B21-7BBD-878D-4DD53818F0B1}"/>
-              </a:ext>
-            </a:extLst>
-          </p:cNvPr>
-          <p:cNvSpPr>
-            <a:spLocks noGrp="1"/>
-          </p:cNvSpPr>
-          <p:nvPr>
-            <p:ph type="body" sz="quarter" idx="12"/>
-          </p:nvPr>
-        </p:nvSpPr>
-        <p:spPr/>
-        <p:txBody>
-          <a:bodyPr/>
-          <a:lstStyle/>
-          <a:p>
-            <a:endParaRPr lang="en-US"/>
-          </a:p>
-        </p:txBody>
-      </p:sp>
-      <p:pic>
-        <p:nvPicPr>
-          <p:cNvPr id="4" name="Picture 3">
-            <a:extLst>
-              <a:ext uri="{FF2B5EF4-FFF2-40B4-BE49-F238E27FC236}">
-                <a16:creationId xmlns:a16="http://schemas.microsoft.com/office/drawing/2014/main" id="{FD7BA6F5-CD36-134F-BA44-9E28BDF63956}"/>
-              </a:ext>
-            </a:extLst>
-          </p:cNvPr>
-          <p:cNvPicPr>
-            <a:picLocks noChangeAspect="1"/>
-          </p:cNvPicPr>
-          <p:nvPr/>
-        </p:nvPicPr>
-        <p:blipFill>
-          <a:blip r:embed="rId2"/>
-          <a:stretch>
-            <a:fillRect/>
-          </a:stretch>
-        </p:blipFill>
-        <p:spPr>
-          <a:xfrm>
-            <a:off x="703000" y="1220213"/>
-            <a:ext cx="9163844" cy="4179932"/>
-          </a:xfrm>
-          <a:prstGeom prst="rect">
-            <a:avLst/>
-          </a:prstGeom>
-        </p:spPr>
-      </p:pic>
-      <p:pic>
-        <p:nvPicPr>
-          <p:cNvPr id="8" name="Picture 7">
-            <a:extLst>
-              <a:ext uri="{FF2B5EF4-FFF2-40B4-BE49-F238E27FC236}">
-                <a16:creationId xmlns:a16="http://schemas.microsoft.com/office/drawing/2014/main" id="{E3BB72C0-807C-2C88-CDF9-6A3C7E14EA7D}"/>
-              </a:ext>
-            </a:extLst>
-          </p:cNvPr>
-          <p:cNvPicPr>
-            <a:picLocks noChangeAspect="1"/>
-          </p:cNvPicPr>
-          <p:nvPr/>
-        </p:nvPicPr>
-        <p:blipFill>
-          <a:blip r:embed="rId3"/>
-          <a:stretch>
-            <a:fillRect/>
-          </a:stretch>
-        </p:blipFill>
-        <p:spPr>
-          <a:xfrm>
-            <a:off x="703000" y="5754759"/>
-            <a:ext cx="6839543" cy="712532"/>
-          </a:xfrm>
-          <a:prstGeom prst="rect">
-            <a:avLst/>
-          </a:prstGeom>
-        </p:spPr>
-      </p:pic>
-    </p:spTree>
-    <p:extLst>
-      <p:ext uri="{BB962C8B-B14F-4D97-AF65-F5344CB8AC3E}">
-        <p14:creationId xmlns:p14="http://schemas.microsoft.com/office/powerpoint/2010/main" val="3119456792"/>
       </p:ext>
     </p:extLst>
   </p:cSld>

</xml_diff>